<commit_message>
Refactoring for ICSA with XSeparation
Signed-off-by: vancam.pham@cea.fr <phamvancam2104@gmail.com>
</commit_message>
<xml_diff>
--- a/CBSE with dynamic.pptx
+++ b/CBSE with dynamic.pptx
@@ -206,7 +206,7 @@
           <a:p>
             <a:fld id="{A1E640F9-6D91-481C-8FFF-D150B3E8A7DC}" type="datetimeFigureOut">
               <a:rPr lang="fr-FR" smtClean="0"/>
-              <a:t>29/09/2016</a:t>
+              <a:t>19/10/2016</a:t>
             </a:fld>
             <a:endParaRPr lang="fr-FR"/>
           </a:p>
@@ -783,7 +783,7 @@
           <a:p>
             <a:fld id="{806CB676-11E3-4648-9A1C-95AF1B65A91B}" type="datetimeFigureOut">
               <a:rPr lang="fr-FR" smtClean="0"/>
-              <a:t>29/09/2016</a:t>
+              <a:t>19/10/2016</a:t>
             </a:fld>
             <a:endParaRPr lang="fr-FR"/>
           </a:p>
@@ -953,7 +953,7 @@
           <a:p>
             <a:fld id="{806CB676-11E3-4648-9A1C-95AF1B65A91B}" type="datetimeFigureOut">
               <a:rPr lang="fr-FR" smtClean="0"/>
-              <a:t>29/09/2016</a:t>
+              <a:t>19/10/2016</a:t>
             </a:fld>
             <a:endParaRPr lang="fr-FR"/>
           </a:p>
@@ -1133,7 +1133,7 @@
           <a:p>
             <a:fld id="{806CB676-11E3-4648-9A1C-95AF1B65A91B}" type="datetimeFigureOut">
               <a:rPr lang="fr-FR" smtClean="0"/>
-              <a:t>29/09/2016</a:t>
+              <a:t>19/10/2016</a:t>
             </a:fld>
             <a:endParaRPr lang="fr-FR"/>
           </a:p>
@@ -1531,7 +1531,7 @@
           <a:p>
             <a:fld id="{806CB676-11E3-4648-9A1C-95AF1B65A91B}" type="datetimeFigureOut">
               <a:rPr lang="fr-FR" smtClean="0"/>
-              <a:t>29/09/2016</a:t>
+              <a:t>19/10/2016</a:t>
             </a:fld>
             <a:endParaRPr lang="fr-FR"/>
           </a:p>
@@ -1777,7 +1777,7 @@
           <a:p>
             <a:fld id="{806CB676-11E3-4648-9A1C-95AF1B65A91B}" type="datetimeFigureOut">
               <a:rPr lang="fr-FR" smtClean="0"/>
-              <a:t>29/09/2016</a:t>
+              <a:t>19/10/2016</a:t>
             </a:fld>
             <a:endParaRPr lang="fr-FR"/>
           </a:p>
@@ -2009,7 +2009,7 @@
           <a:p>
             <a:fld id="{806CB676-11E3-4648-9A1C-95AF1B65A91B}" type="datetimeFigureOut">
               <a:rPr lang="fr-FR" smtClean="0"/>
-              <a:t>29/09/2016</a:t>
+              <a:t>19/10/2016</a:t>
             </a:fld>
             <a:endParaRPr lang="fr-FR"/>
           </a:p>
@@ -2376,7 +2376,7 @@
           <a:p>
             <a:fld id="{806CB676-11E3-4648-9A1C-95AF1B65A91B}" type="datetimeFigureOut">
               <a:rPr lang="fr-FR" smtClean="0"/>
-              <a:t>29/09/2016</a:t>
+              <a:t>19/10/2016</a:t>
             </a:fld>
             <a:endParaRPr lang="fr-FR"/>
           </a:p>
@@ -2494,7 +2494,7 @@
           <a:p>
             <a:fld id="{806CB676-11E3-4648-9A1C-95AF1B65A91B}" type="datetimeFigureOut">
               <a:rPr lang="fr-FR" smtClean="0"/>
-              <a:t>29/09/2016</a:t>
+              <a:t>19/10/2016</a:t>
             </a:fld>
             <a:endParaRPr lang="fr-FR"/>
           </a:p>
@@ -2589,7 +2589,7 @@
           <a:p>
             <a:fld id="{806CB676-11E3-4648-9A1C-95AF1B65A91B}" type="datetimeFigureOut">
               <a:rPr lang="fr-FR" smtClean="0"/>
-              <a:t>29/09/2016</a:t>
+              <a:t>19/10/2016</a:t>
             </a:fld>
             <a:endParaRPr lang="fr-FR"/>
           </a:p>
@@ -2866,7 +2866,7 @@
           <a:p>
             <a:fld id="{806CB676-11E3-4648-9A1C-95AF1B65A91B}" type="datetimeFigureOut">
               <a:rPr lang="fr-FR" smtClean="0"/>
-              <a:t>29/09/2016</a:t>
+              <a:t>19/10/2016</a:t>
             </a:fld>
             <a:endParaRPr lang="fr-FR"/>
           </a:p>
@@ -3119,7 +3119,7 @@
           <a:p>
             <a:fld id="{806CB676-11E3-4648-9A1C-95AF1B65A91B}" type="datetimeFigureOut">
               <a:rPr lang="fr-FR" smtClean="0"/>
-              <a:t>29/09/2016</a:t>
+              <a:t>19/10/2016</a:t>
             </a:fld>
             <a:endParaRPr lang="fr-FR"/>
           </a:p>
@@ -3332,7 +3332,7 @@
           <a:p>
             <a:fld id="{806CB676-11E3-4648-9A1C-95AF1B65A91B}" type="datetimeFigureOut">
               <a:rPr lang="fr-FR" smtClean="0"/>
-              <a:t>29/09/2016</a:t>
+              <a:t>19/10/2016</a:t>
             </a:fld>
             <a:endParaRPr lang="fr-FR"/>
           </a:p>
@@ -3762,7 +3762,15 @@
           <a:p>
             <a:r>
               <a:rPr lang="en-US" smtClean="0"/>
-              <a:t>Dynamic connector for component based embedded system development: A hybrid approach of modeling and programming</a:t>
+              <a:t>Dynamic connector for </a:t>
+            </a:r>
+            <a:r>
+              <a:rPr lang="en-US" smtClean="0"/>
+              <a:t>component-based </a:t>
+            </a:r>
+            <a:r>
+              <a:rPr lang="en-US" smtClean="0"/>
+              <a:t>embedded system development: A hybrid approach of modeling and programming</a:t>
             </a:r>
             <a:endParaRPr lang="fr-FR"/>
           </a:p>
@@ -6734,11 +6742,7 @@
             <a:pPr lvl="1"/>
             <a:r>
               <a:rPr lang="en-US" smtClean="0"/>
-              <a:t>Reuse maximally existing constructs in OO languages such as class, </a:t>
-            </a:r>
-            <a:r>
-              <a:rPr lang="en-US" smtClean="0"/>
-              <a:t>attribute</a:t>
+              <a:t>Reuse maximally existing constructs in OO languages such as class, attribute</a:t>
             </a:r>
           </a:p>
           <a:p>
@@ -7449,11 +7453,7 @@
                     <a:p>
                       <a:r>
                         <a:rPr lang="en-US" smtClean="0"/>
-                        <a:t>Provided port </a:t>
-                      </a:r>
-                      <a:r>
-                        <a:rPr lang="en-US" smtClean="0"/>
-                        <a:t>constraints (OCL)</a:t>
+                        <a:t>Provided port constraints (OCL)</a:t>
                       </a:r>
                       <a:endParaRPr lang="fr-FR"/>
                     </a:p>
@@ -8826,15 +8826,7 @@
             </a:pPr>
             <a:r>
               <a:rPr lang="en-US" smtClean="0"/>
-              <a:t>Match: A match B =&gt; A = B or A </a:t>
-            </a:r>
-            <a:r>
-              <a:rPr lang="en-US" smtClean="0"/>
-              <a:t>inherits from </a:t>
-            </a:r>
-            <a:r>
-              <a:rPr lang="en-US" smtClean="0"/>
-              <a:t>B.</a:t>
+              <a:t>Match: A match B =&gt; A = B or A inherits from B.</a:t>
             </a:r>
           </a:p>
           <a:p>

</xml_diff>